<commit_message>
Small refinements of Powerpoint xmlprague 2020.
</commit_message>
<xml_diff>
--- a/documentation/greenfox-xmlprague-2020.pptx
+++ b/documentation/greenfox-xmlprague-2020.pptx
@@ -27978,7 +27978,7 @@
                                           </p:stCondLst>
                                         </p:cTn>
                                         <p:tgtEl>
-                                          <p:spTgt spid="11"/>
+                                          <p:spTgt spid="17"/>
                                         </p:tgtEl>
                                         <p:attrNameLst>
                                           <p:attrName>style.visibility</p:attrName>
@@ -28023,7 +28023,7 @@
                                           </p:stCondLst>
                                         </p:cTn>
                                         <p:tgtEl>
-                                          <p:spTgt spid="17"/>
+                                          <p:spTgt spid="11"/>
                                         </p:tgtEl>
                                         <p:attrNameLst>
                                           <p:attrName>style.visibility</p:attrName>
@@ -30303,38 +30303,48 @@
             <a:r>
               <a:rPr lang="de-DE" smtClean="0">
                 <a:solidFill>
-                  <a:srgbClr val="006600"/>
+                  <a:srgbClr val="CC0000"/>
                 </a:solidFill>
               </a:rPr>
               <a:t>Implementation</a:t>
             </a:r>
             <a:endParaRPr lang="de-DE">
               <a:solidFill>
-                <a:srgbClr val="006600"/>
+                <a:srgbClr val="CC0000"/>
               </a:solidFill>
             </a:endParaRPr>
           </a:p>
         </p:txBody>
       </p:sp>
-      <p:sp>
-        <p:nvSpPr>
-          <p:cNvPr id="3" name="Content Placeholder 2"/>
-          <p:cNvSpPr>
-            <a:spLocks noGrp="1"/>
-          </p:cNvSpPr>
+      <p:pic>
+        <p:nvPicPr>
+          <p:cNvPr id="9" name="Content Placeholder 8"/>
+          <p:cNvPicPr>
+            <a:picLocks noGrp="1" noChangeAspect="1"/>
+          </p:cNvPicPr>
           <p:nvPr>
             <p:ph idx="1"/>
           </p:nvPr>
-        </p:nvSpPr>
-        <p:spPr/>
-        <p:txBody>
-          <a:bodyPr/>
-          <a:lstStyle/>
-          <a:p>
-            <a:endParaRPr lang="de-DE"/>
-          </a:p>
-        </p:txBody>
-      </p:sp>
+        </p:nvPicPr>
+        <p:blipFill>
+          <a:blip r:embed="rId2">
+            <a:extLst>
+              <a:ext uri="{28A0092B-C50C-407E-A947-70E740481C1C}">
+                <a14:useLocalDpi xmlns:a14="http://schemas.microsoft.com/office/drawing/2010/main" val="0"/>
+              </a:ext>
+            </a:extLst>
+          </a:blip>
+          <a:stretch>
+            <a:fillRect/>
+          </a:stretch>
+        </p:blipFill>
+        <p:spPr>
+          <a:xfrm>
+            <a:off x="7454478" y="-10647"/>
+            <a:ext cx="1685925" cy="1685925"/>
+          </a:xfrm>
+        </p:spPr>
+      </p:pic>
       <p:sp>
         <p:nvSpPr>
           <p:cNvPr id="4" name="Date Placeholder 3"/>

</xml_diff>